<commit_message>
Changes on final files
</commit_message>
<xml_diff>
--- a/Covid-19 in Mexico analysis.pptx
+++ b/Covid-19 in Mexico analysis.pptx
@@ -1361,7 +1361,7 @@
           <a:graphicData uri="http://schemas.openxmlformats.org/presentationml/2006/ole">
             <mc:AlternateContent xmlns:mc="http://schemas.openxmlformats.org/markup-compatibility/2006">
               <mc:Choice xmlns:v="urn:schemas-microsoft-com:vml" Requires="v">
-                <p:oleObj spid="_x0000_s18501" name="think-cell Slide" r:id="rId4" imgW="270" imgH="270" progId="TCLayout.ActiveDocument.1">
+                <p:oleObj spid="_x0000_s18504" name="think-cell Slide" r:id="rId4" imgW="270" imgH="270" progId="TCLayout.ActiveDocument.1">
                   <p:embed/>
                 </p:oleObj>
               </mc:Choice>
@@ -3279,7 +3279,7 @@
           <a:graphicData uri="http://schemas.openxmlformats.org/presentationml/2006/ole">
             <mc:AlternateContent xmlns:mc="http://schemas.openxmlformats.org/markup-compatibility/2006">
               <mc:Choice xmlns:v="urn:schemas-microsoft-com:vml" Requires="v">
-                <p:oleObj spid="_x0000_s2168" name="think-cell Slide" r:id="rId4" imgW="270" imgH="270" progId="TCLayout.ActiveDocument.1">
+                <p:oleObj spid="_x0000_s2171" name="think-cell Slide" r:id="rId4" imgW="270" imgH="270" progId="TCLayout.ActiveDocument.1">
                   <p:embed/>
                 </p:oleObj>
               </mc:Choice>
@@ -5374,7 +5374,7 @@
           <a:graphicData uri="http://schemas.openxmlformats.org/presentationml/2006/ole">
             <mc:AlternateContent xmlns:mc="http://schemas.openxmlformats.org/markup-compatibility/2006">
               <mc:Choice xmlns:v="urn:schemas-microsoft-com:vml" Requires="v">
-                <p:oleObj spid="_x0000_s1144" name="think-cell Slide" r:id="rId11" imgW="270" imgH="270" progId="TCLayout.ActiveDocument.1">
+                <p:oleObj spid="_x0000_s1147" name="think-cell Slide" r:id="rId11" imgW="270" imgH="270" progId="TCLayout.ActiveDocument.1">
                   <p:embed/>
                 </p:oleObj>
               </mc:Choice>
@@ -6197,7 +6197,7 @@
           <a:graphicData uri="http://schemas.openxmlformats.org/presentationml/2006/ole">
             <mc:AlternateContent xmlns:mc="http://schemas.openxmlformats.org/markup-compatibility/2006">
               <mc:Choice xmlns:v="urn:schemas-microsoft-com:vml" Requires="v">
-                <p:oleObj spid="_x0000_s17478" name="think-cell Slide" r:id="rId11" imgW="270" imgH="270" progId="TCLayout.ActiveDocument.1">
+                <p:oleObj spid="_x0000_s17481" name="think-cell Slide" r:id="rId11" imgW="270" imgH="270" progId="TCLayout.ActiveDocument.1">
                   <p:embed/>
                 </p:oleObj>
               </mc:Choice>
@@ -7017,7 +7017,7 @@
           <a:graphicData uri="http://schemas.openxmlformats.org/presentationml/2006/ole">
             <mc:AlternateContent xmlns:mc="http://schemas.openxmlformats.org/markup-compatibility/2006">
               <mc:Choice xmlns:v="urn:schemas-microsoft-com:vml" Requires="v">
-                <p:oleObj spid="_x0000_s46118" name="think-cell Slide" r:id="rId5" imgW="473" imgH="473" progId="TCLayout.ActiveDocument.1">
+                <p:oleObj spid="_x0000_s46121" name="think-cell Slide" r:id="rId5" imgW="473" imgH="473" progId="TCLayout.ActiveDocument.1">
                   <p:embed/>
                 </p:oleObj>
               </mc:Choice>
@@ -7364,7 +7364,7 @@
           <a:graphicData uri="http://schemas.openxmlformats.org/presentationml/2006/ole">
             <mc:AlternateContent xmlns:mc="http://schemas.openxmlformats.org/markup-compatibility/2006">
               <mc:Choice xmlns:v="urn:schemas-microsoft-com:vml" Requires="v">
-                <p:oleObj spid="_x0000_s51239" name="think-cell Slide" r:id="rId6" imgW="473" imgH="473" progId="TCLayout.ActiveDocument.1">
+                <p:oleObj spid="_x0000_s51242" name="think-cell Slide" r:id="rId6" imgW="473" imgH="473" progId="TCLayout.ActiveDocument.1">
                   <p:embed/>
                 </p:oleObj>
               </mc:Choice>
@@ -8384,7 +8384,7 @@
                   <a:srgbClr val="00B0F0"/>
                 </a:solidFill>
               </a:rPr>
-              <a:t>42 Hospital in Valle has no availability for patients with Covid-19</a:t>
+              <a:t>42 Hospital in Valle have no availability for patients with Covid-19</a:t>
             </a:r>
             <a:endParaRPr lang="en-US" sz="1400" b="1" dirty="0">
               <a:solidFill>
@@ -8556,7 +8556,7 @@
           <a:graphicData uri="http://schemas.openxmlformats.org/presentationml/2006/ole">
             <mc:AlternateContent xmlns:mc="http://schemas.openxmlformats.org/markup-compatibility/2006">
               <mc:Choice xmlns:v="urn:schemas-microsoft-com:vml" Requires="v">
-                <p:oleObj spid="_x0000_s57355" name="think-cell Slide" r:id="rId5" imgW="473" imgH="473" progId="TCLayout.ActiveDocument.1">
+                <p:oleObj spid="_x0000_s57358" name="think-cell Slide" r:id="rId5" imgW="473" imgH="473" progId="TCLayout.ActiveDocument.1">
                   <p:embed/>
                 </p:oleObj>
               </mc:Choice>
@@ -9374,7 +9374,7 @@
           <a:graphicData uri="http://schemas.openxmlformats.org/presentationml/2006/ole">
             <mc:AlternateContent xmlns:mc="http://schemas.openxmlformats.org/markup-compatibility/2006">
               <mc:Choice xmlns:v="urn:schemas-microsoft-com:vml" Requires="v">
-                <p:oleObj spid="_x0000_s56336" name="think-cell Slide" r:id="rId5" imgW="473" imgH="473" progId="TCLayout.ActiveDocument.1">
+                <p:oleObj spid="_x0000_s56339" name="think-cell Slide" r:id="rId5" imgW="473" imgH="473" progId="TCLayout.ActiveDocument.1">
                   <p:embed/>
                 </p:oleObj>
               </mc:Choice>
@@ -9838,7 +9838,7 @@
           <a:graphicData uri="http://schemas.openxmlformats.org/presentationml/2006/ole">
             <mc:AlternateContent xmlns:mc="http://schemas.openxmlformats.org/markup-compatibility/2006">
               <mc:Choice xmlns:v="urn:schemas-microsoft-com:vml" Requires="v">
-                <p:oleObj spid="_x0000_s47139" name="think-cell Slide" r:id="rId15" imgW="473" imgH="473" progId="TCLayout.ActiveDocument.1">
+                <p:oleObj spid="_x0000_s47142" name="think-cell Slide" r:id="rId15" imgW="473" imgH="473" progId="TCLayout.ActiveDocument.1">
                   <p:embed/>
                 </p:oleObj>
               </mc:Choice>
@@ -10797,7 +10797,7 @@
               <a:rPr lang="en-US" sz="1200" dirty="0">
                 <a:ea typeface="+mj-ea"/>
               </a:rPr>
-              <a:t>Can enter us directly through our eyes nose or mouth</a:t>
+              <a:t>Can enter us directly through our eyes, nose or mouth</a:t>
             </a:r>
           </a:p>
           <a:p>
@@ -10971,23 +10971,7 @@
                   <a:schemeClr val="bg1"/>
                 </a:solidFill>
               </a:rPr>
-              <a:t>Covid-19 </a:t>
-            </a:r>
-            <a:r>
-              <a:rPr lang="en-US" sz="1400" b="1" dirty="0" err="1">
-                <a:solidFill>
-                  <a:schemeClr val="bg1"/>
-                </a:solidFill>
-              </a:rPr>
-              <a:t>Curent</a:t>
-            </a:r>
-            <a:r>
-              <a:rPr lang="en-US" sz="1400" b="1" dirty="0">
-                <a:solidFill>
-                  <a:schemeClr val="bg1"/>
-                </a:solidFill>
-              </a:rPr>
-              <a:t> Rate of Transmission of 4%</a:t>
+              <a:t>Covid-19 Current Rate of Transmission of 4%</a:t>
             </a:r>
           </a:p>
         </p:txBody>
@@ -11034,7 +11018,7 @@
               <a:rPr lang="en-US" sz="800" dirty="0">
                 <a:ea typeface="+mj-ea"/>
               </a:rPr>
-              <a:t>Jan 1: China reporter a cluster of cases of pneumonia</a:t>
+              <a:t>Jan 1: China reported a cluster of cases of pneumonia</a:t>
             </a:r>
           </a:p>
         </p:txBody>
@@ -11222,7 +11206,7 @@
               <a:rPr lang="en-US" sz="800" dirty="0">
                 <a:ea typeface="+mj-ea"/>
               </a:rPr>
-              <a:t>Mar 24: Stage 2 Starts: Local disease transmission</a:t>
+              <a:t>Mar 24: Stage 2 starts: Local disease transmission</a:t>
             </a:r>
           </a:p>
         </p:txBody>
@@ -11267,7 +11251,7 @@
             </a:pPr>
             <a:r>
               <a:rPr lang="en-US" sz="800" dirty="0"/>
-              <a:t>April 21: Stage 3 Starts: Thousands of cases in different regions across the country</a:t>
+              <a:t>April 21: Stage 3 starts: Thousands of cases in different regions across the country</a:t>
             </a:r>
             <a:endParaRPr lang="en-US" sz="800" dirty="0">
               <a:ea typeface="+mj-ea"/>
@@ -13905,7 +13889,7 @@
                   <a:srgbClr val="00B0F0"/>
                 </a:solidFill>
               </a:rPr>
-              <a:t>Total Test Preformed</a:t>
+              <a:t>Total Test Performed</a:t>
             </a:r>
           </a:p>
           <a:p>
@@ -14977,7 +14961,7 @@
           <a:graphicData uri="http://schemas.openxmlformats.org/presentationml/2006/ole">
             <mc:AlternateContent xmlns:mc="http://schemas.openxmlformats.org/markup-compatibility/2006">
               <mc:Choice xmlns:v="urn:schemas-microsoft-com:vml" Requires="v">
-                <p:oleObj spid="_x0000_s50215" name="think-cell Slide" r:id="rId6" imgW="473" imgH="473" progId="TCLayout.ActiveDocument.1">
+                <p:oleObj spid="_x0000_s50218" name="think-cell Slide" r:id="rId6" imgW="473" imgH="473" progId="TCLayout.ActiveDocument.1">
                   <p:embed/>
                 </p:oleObj>
               </mc:Choice>
@@ -16005,7 +15989,7 @@
           <a:graphicData uri="http://schemas.openxmlformats.org/presentationml/2006/ole">
             <mc:AlternateContent xmlns:mc="http://schemas.openxmlformats.org/markup-compatibility/2006">
               <mc:Choice xmlns:v="urn:schemas-microsoft-com:vml" Requires="v">
-                <p:oleObj spid="_x0000_s48172" name="think-cell Slide" r:id="rId6" imgW="473" imgH="473" progId="TCLayout.ActiveDocument.1">
+                <p:oleObj spid="_x0000_s48175" name="think-cell Slide" r:id="rId6" imgW="473" imgH="473" progId="TCLayout.ActiveDocument.1">
                   <p:embed/>
                 </p:oleObj>
               </mc:Choice>
@@ -17096,7 +17080,7 @@
           <a:graphicData uri="http://schemas.openxmlformats.org/presentationml/2006/ole">
             <mc:AlternateContent xmlns:mc="http://schemas.openxmlformats.org/markup-compatibility/2006">
               <mc:Choice xmlns:v="urn:schemas-microsoft-com:vml" Requires="v">
-                <p:oleObj spid="_x0000_s49191" name="think-cell Slide" r:id="rId7" imgW="473" imgH="473" progId="TCLayout.ActiveDocument.1">
+                <p:oleObj spid="_x0000_s49194" name="think-cell Slide" r:id="rId7" imgW="473" imgH="473" progId="TCLayout.ActiveDocument.1">
                   <p:embed/>
                 </p:oleObj>
               </mc:Choice>
@@ -17665,7 +17649,7 @@
           <a:graphicData uri="http://schemas.openxmlformats.org/presentationml/2006/ole">
             <mc:AlternateContent xmlns:mc="http://schemas.openxmlformats.org/markup-compatibility/2006">
               <mc:Choice xmlns:v="urn:schemas-microsoft-com:vml" Requires="v">
-                <p:oleObj spid="_x0000_s52258" name="think-cell Slide" r:id="rId5" imgW="473" imgH="473" progId="TCLayout.ActiveDocument.1">
+                <p:oleObj spid="_x0000_s52261" name="think-cell Slide" r:id="rId5" imgW="473" imgH="473" progId="TCLayout.ActiveDocument.1">
                   <p:embed/>
                 </p:oleObj>
               </mc:Choice>
@@ -19900,7 +19884,7 @@
           <a:graphicData uri="http://schemas.openxmlformats.org/presentationml/2006/ole">
             <mc:AlternateContent xmlns:mc="http://schemas.openxmlformats.org/markup-compatibility/2006">
               <mc:Choice xmlns:v="urn:schemas-microsoft-com:vml" Requires="v">
-                <p:oleObj spid="_x0000_s53283" name="think-cell Slide" r:id="rId6" imgW="473" imgH="473" progId="TCLayout.ActiveDocument.1">
+                <p:oleObj spid="_x0000_s53286" name="think-cell Slide" r:id="rId6" imgW="473" imgH="473" progId="TCLayout.ActiveDocument.1">
                   <p:embed/>
                 </p:oleObj>
               </mc:Choice>
@@ -20841,7 +20825,7 @@
           <a:graphicData uri="http://schemas.openxmlformats.org/presentationml/2006/ole">
             <mc:AlternateContent xmlns:mc="http://schemas.openxmlformats.org/markup-compatibility/2006">
               <mc:Choice xmlns:v="urn:schemas-microsoft-com:vml" Requires="v">
-                <p:oleObj spid="_x0000_s54301" name="think-cell Slide" r:id="rId5" imgW="473" imgH="473" progId="TCLayout.ActiveDocument.1">
+                <p:oleObj spid="_x0000_s54304" name="think-cell Slide" r:id="rId5" imgW="473" imgH="473" progId="TCLayout.ActiveDocument.1">
                   <p:embed/>
                 </p:oleObj>
               </mc:Choice>
@@ -21414,7 +21398,7 @@
           <a:graphicData uri="http://schemas.openxmlformats.org/presentationml/2006/ole">
             <mc:AlternateContent xmlns:mc="http://schemas.openxmlformats.org/markup-compatibility/2006">
               <mc:Choice xmlns:v="urn:schemas-microsoft-com:vml" Requires="v">
-                <p:oleObj spid="_x0000_s55324" name="think-cell Slide" r:id="rId5" imgW="473" imgH="473" progId="TCLayout.ActiveDocument.1">
+                <p:oleObj spid="_x0000_s55327" name="think-cell Slide" r:id="rId5" imgW="473" imgH="473" progId="TCLayout.ActiveDocument.1">
                   <p:embed/>
                 </p:oleObj>
               </mc:Choice>
@@ -21845,7 +21829,7 @@
                   <a:srgbClr val="00B0F0"/>
                 </a:solidFill>
               </a:rPr>
-              <a:t>Death rate</a:t>
+              <a:t>Mortality rate</a:t>
             </a:r>
           </a:p>
         </p:txBody>
@@ -26266,11 +26250,11 @@
 </file>
 
 <file path=customXml/item2.xml><?xml version="1.0" encoding="utf-8"?>
-<XMLData TextToDisplay="%CLASSIFICATIONDATETIME%">15:04 15/05/2020</XMLData>
+<XMLData TextToDisplay="RightsWATCHMark">8|CITI-No PII-Internal|{00000000-0000-0000-0000-000000000000}</XMLData>
 </file>
 
 <file path=customXml/item3.xml><?xml version="1.0" encoding="utf-8"?>
-<XMLData TextToDisplay="RightsWATCHMark">8|CITI-No PII-Internal|{00000000-0000-0000-0000-000000000000}</XMLData>
+<XMLData TextToDisplay="%CLASSIFICATIONDATETIME%">15:04 15/05/2020</XMLData>
 </file>
 
 <file path=customXml/itemProps1.xml><?xml version="1.0" encoding="utf-8"?>
@@ -26280,13 +26264,13 @@
 </file>
 
 <file path=customXml/itemProps2.xml><?xml version="1.0" encoding="utf-8"?>
-<ds:datastoreItem xmlns:ds="http://schemas.openxmlformats.org/officeDocument/2006/customXml" ds:itemID="{9DD98D10-4B39-4445-A0E8-745469C6D8B3}">
+<ds:datastoreItem xmlns:ds="http://schemas.openxmlformats.org/officeDocument/2006/customXml" ds:itemID="{7DE38A00-790F-4C6D-98C3-457AEE210FE8}">
   <ds:schemaRefs/>
 </ds:datastoreItem>
 </file>
 
 <file path=customXml/itemProps3.xml><?xml version="1.0" encoding="utf-8"?>
-<ds:datastoreItem xmlns:ds="http://schemas.openxmlformats.org/officeDocument/2006/customXml" ds:itemID="{7DE38A00-790F-4C6D-98C3-457AEE210FE8}">
+<ds:datastoreItem xmlns:ds="http://schemas.openxmlformats.org/officeDocument/2006/customXml" ds:itemID="{9DD98D10-4B39-4445-A0E8-745469C6D8B3}">
   <ds:schemaRefs/>
 </ds:datastoreItem>
 </file>
</xml_diff>